<commit_message>
使用vue cli3 lib模式打包，输入umd文件 :cherry_blossom:
</commit_message>
<xml_diff>
--- a/note/UI总结.pptx
+++ b/note/UI总结.pptx
@@ -5415,6 +5415,55 @@
                       <a:pPr>
                         <a:buNone/>
                       </a:pPr>
+                      <a:r>
+                        <a:rPr lang="en-US" altLang="zh-CN"/>
+                        <a:t>modal</a:t>
+                      </a:r>
+                      <a:r>
+                        <a:rPr lang="zh-CN" altLang="en-US"/>
+                        <a:t>（</a:t>
+                      </a:r>
+                      <a:r>
+                        <a:rPr lang="zh-CN" altLang="en-US" sz="1800">
+                          <a:solidFill>
+                            <a:schemeClr val="bg2">
+                              <a:lumMod val="50000"/>
+                            </a:schemeClr>
+                          </a:solidFill>
+                          <a:sym typeface="+mn-ea"/>
+                        </a:rPr>
+                        <a:t>插件，</a:t>
+                      </a:r>
+                      <a:r>
+                        <a:rPr lang="zh-CN" altLang="en-US" sz="1800">
+                          <a:solidFill>
+                            <a:srgbClr val="FF0000"/>
+                          </a:solidFill>
+                          <a:sym typeface="+mn-ea"/>
+                        </a:rPr>
+                        <a:t>事件监听</a:t>
+                      </a:r>
+                      <a:r>
+                        <a:rPr lang="zh-CN" altLang="en-US" sz="1800">
+                          <a:sym typeface="+mn-ea"/>
+                        </a:rPr>
+                        <a:t>，</a:t>
+                      </a:r>
+                      <a:r>
+                        <a:rPr lang="en-US" altLang="zh-CN" sz="1800">
+                          <a:solidFill>
+                            <a:schemeClr val="accent2">
+                              <a:lumMod val="75000"/>
+                            </a:schemeClr>
+                          </a:solidFill>
+                          <a:sym typeface="+mn-ea"/>
+                        </a:rPr>
+                        <a:t>js Dom</a:t>
+                      </a:r>
+                      <a:r>
+                        <a:rPr lang="zh-CN" altLang="en-US"/>
+                        <a:t>）</a:t>
+                      </a:r>
                       <a:endParaRPr lang="zh-CN" altLang="en-US"/>
                     </a:p>
                   </a:txBody>
@@ -5960,7 +6009,7 @@
         </p:nvSpPr>
         <p:spPr>
           <a:xfrm>
-            <a:off x="2235835" y="3714115"/>
+            <a:off x="2471420" y="4834890"/>
             <a:ext cx="1922780" cy="826135"/>
           </a:xfrm>
           <a:prstGeom prst="ellipse">

</xml_diff>